<commit_message>
Update CaseStudy Final Presentation.pptx
</commit_message>
<xml_diff>
--- a/Final presentation/CaseStudy Final Presentation.pptx
+++ b/Final presentation/CaseStudy Final Presentation.pptx
@@ -262,7 +262,7 @@
           <a:p>
             <a:fld id="{E5CB2E47-6F41-409B-AD22-834AE1EFF186}" type="datetimeFigureOut">
               <a:rPr lang="en-US" smtClean="0"/>
-              <a:t>26-Aug-19</a:t>
+              <a:t>27-Aug-19</a:t>
             </a:fld>
             <a:endParaRPr lang="en-US"/>
           </a:p>
@@ -427,7 +427,7 @@
           <a:p>
             <a:fld id="{FAD6744A-403D-42A1-BFE7-61DA46EE7C6C}" type="datetimeFigureOut">
               <a:rPr lang="en-US" smtClean="0"/>
-              <a:t>26-Aug-19</a:t>
+              <a:t>27-Aug-19</a:t>
             </a:fld>
             <a:endParaRPr lang="en-US"/>
           </a:p>
@@ -1120,7 +1120,7 @@
           <a:p>
             <a:fld id="{349BF3EA-1A78-4F07-BDC0-C8A1BD461199}" type="datetimeFigureOut">
               <a:rPr lang="en-US" smtClean="0"/>
-              <a:t>26-Aug-19</a:t>
+              <a:t>27-Aug-19</a:t>
             </a:fld>
             <a:endParaRPr lang="en-US"/>
           </a:p>
@@ -1304,7 +1304,7 @@
           <a:p>
             <a:fld id="{349BF3EA-1A78-4F07-BDC0-C8A1BD461199}" type="datetimeFigureOut">
               <a:rPr lang="en-US" smtClean="0"/>
-              <a:t>26-Aug-19</a:t>
+              <a:t>27-Aug-19</a:t>
             </a:fld>
             <a:endParaRPr lang="en-US"/>
           </a:p>
@@ -1498,7 +1498,7 @@
           <a:p>
             <a:fld id="{349BF3EA-1A78-4F07-BDC0-C8A1BD461199}" type="datetimeFigureOut">
               <a:rPr lang="en-US" smtClean="0"/>
-              <a:t>26-Aug-19</a:t>
+              <a:t>27-Aug-19</a:t>
             </a:fld>
             <a:endParaRPr lang="en-US"/>
           </a:p>
@@ -1687,7 +1687,7 @@
           <a:p>
             <a:fld id="{349BF3EA-1A78-4F07-BDC0-C8A1BD461199}" type="datetimeFigureOut">
               <a:rPr lang="en-US" smtClean="0"/>
-              <a:t>26-Aug-19</a:t>
+              <a:t>27-Aug-19</a:t>
             </a:fld>
             <a:endParaRPr lang="en-US"/>
           </a:p>
@@ -2152,7 +2152,7 @@
           <a:p>
             <a:fld id="{349BF3EA-1A78-4F07-BDC0-C8A1BD461199}" type="datetimeFigureOut">
               <a:rPr lang="en-US" smtClean="0"/>
-              <a:t>26-Aug-19</a:t>
+              <a:t>27-Aug-19</a:t>
             </a:fld>
             <a:endParaRPr lang="en-US"/>
           </a:p>
@@ -2398,7 +2398,7 @@
           <a:p>
             <a:fld id="{349BF3EA-1A78-4F07-BDC0-C8A1BD461199}" type="datetimeFigureOut">
               <a:rPr lang="en-US" smtClean="0"/>
-              <a:t>26-Aug-19</a:t>
+              <a:t>27-Aug-19</a:t>
             </a:fld>
             <a:endParaRPr lang="en-US"/>
           </a:p>
@@ -2783,7 +2783,7 @@
           <a:p>
             <a:fld id="{349BF3EA-1A78-4F07-BDC0-C8A1BD461199}" type="datetimeFigureOut">
               <a:rPr lang="en-US" smtClean="0"/>
-              <a:t>26-Aug-19</a:t>
+              <a:t>27-Aug-19</a:t>
             </a:fld>
             <a:endParaRPr lang="en-US"/>
           </a:p>
@@ -2915,7 +2915,7 @@
           <a:p>
             <a:fld id="{349BF3EA-1A78-4F07-BDC0-C8A1BD461199}" type="datetimeFigureOut">
               <a:rPr lang="en-US" smtClean="0"/>
-              <a:t>26-Aug-19</a:t>
+              <a:t>27-Aug-19</a:t>
             </a:fld>
             <a:endParaRPr lang="en-US"/>
           </a:p>
@@ -3025,7 +3025,7 @@
           <a:p>
             <a:fld id="{349BF3EA-1A78-4F07-BDC0-C8A1BD461199}" type="datetimeFigureOut">
               <a:rPr lang="en-US" smtClean="0"/>
-              <a:t>26-Aug-19</a:t>
+              <a:t>27-Aug-19</a:t>
             </a:fld>
             <a:endParaRPr lang="en-US"/>
           </a:p>
@@ -3368,7 +3368,7 @@
           <a:p>
             <a:fld id="{349BF3EA-1A78-4F07-BDC0-C8A1BD461199}" type="datetimeFigureOut">
               <a:rPr lang="en-US" smtClean="0"/>
-              <a:t>26-Aug-19</a:t>
+              <a:t>27-Aug-19</a:t>
             </a:fld>
             <a:endParaRPr lang="en-US"/>
           </a:p>
@@ -3756,7 +3756,7 @@
           <a:p>
             <a:fld id="{349BF3EA-1A78-4F07-BDC0-C8A1BD461199}" type="datetimeFigureOut">
               <a:rPr lang="en-US" smtClean="0"/>
-              <a:t>26-Aug-19</a:t>
+              <a:t>27-Aug-19</a:t>
             </a:fld>
             <a:endParaRPr lang="en-US"/>
           </a:p>
@@ -4116,7 +4116,7 @@
           <a:p>
             <a:fld id="{349BF3EA-1A78-4F07-BDC0-C8A1BD461199}" type="datetimeFigureOut">
               <a:rPr lang="en-US" smtClean="0"/>
-              <a:t>26-Aug-19</a:t>
+              <a:t>27-Aug-19</a:t>
             </a:fld>
             <a:endParaRPr lang="en-US"/>
           </a:p>
@@ -16215,7 +16215,7 @@
             <a:pPr lvl="1"/>
             <a:r>
               <a:rPr lang="en-US" dirty="0"/>
-              <a:t>RM1,200 * 100 = RM120,000 per</a:t>
+              <a:t>RM1,200 * 50 = RM60,000 per</a:t>
             </a:r>
           </a:p>
           <a:p>
@@ -16224,7 +16224,7 @@
             </a:pPr>
             <a:r>
               <a:rPr lang="en-US" dirty="0"/>
-              <a:t>month * 12 = RM 1,440,000.00</a:t>
+              <a:t>month * 12 = RM 720,000.00</a:t>
             </a:r>
           </a:p>
           <a:p>
@@ -17767,11 +17767,16 @@
           </p:cNvGraphicFramePr>
           <p:nvPr>
             <p:ph sz="quarter" idx="1"/>
+            <p:extLst>
+              <p:ext uri="{D42A27DB-BD31-4B8C-83A1-F6EECF244321}">
+                <p14:modId xmlns:p14="http://schemas.microsoft.com/office/powerpoint/2010/main" val="1440574134"/>
+              </p:ext>
+            </p:extLst>
           </p:nvPr>
         </p:nvGraphicFramePr>
         <p:xfrm>
           <a:off x="1014083" y="4167738"/>
-          <a:ext cx="9753600" cy="2222452"/>
+          <a:ext cx="9753600" cy="1946072"/>
         </p:xfrm>
         <a:graphic>
           <a:graphicData uri="http://schemas.openxmlformats.org/drawingml/2006/table">
@@ -18163,12 +18168,12 @@
                         </a:spcAft>
                       </a:pPr>
                       <a:r>
-                        <a:rPr lang="en-US" sz="1200">
+                        <a:rPr lang="en-US" sz="1200" dirty="0">
                           <a:effectLst/>
                         </a:rPr>
-                        <a:t>1,440,000.00</a:t>
+                        <a:t>720,000.00</a:t>
                       </a:r>
-                      <a:endParaRPr lang="en-US" sz="1100">
+                      <a:endParaRPr lang="en-US" sz="1100" dirty="0">
                         <a:effectLst/>
                         <a:latin typeface="Calibri" panose="020F0502020204030204" pitchFamily="34" charset="0"/>
                         <a:ea typeface="PMingLiU" panose="02020500000000000000" pitchFamily="18" charset="-120"/>
@@ -18195,12 +18200,12 @@
                         </a:spcAft>
                       </a:pPr>
                       <a:r>
-                        <a:rPr lang="en-US" sz="1200">
+                        <a:rPr lang="en-US" sz="1200" dirty="0">
                           <a:effectLst/>
                         </a:rPr>
-                        <a:t>1,440,000.00</a:t>
+                        <a:t>720,000.00</a:t>
                       </a:r>
-                      <a:endParaRPr lang="en-US" sz="1100">
+                      <a:endParaRPr lang="en-US" sz="1100" dirty="0">
                         <a:effectLst/>
                         <a:latin typeface="Calibri" panose="020F0502020204030204" pitchFamily="34" charset="0"/>
                         <a:ea typeface="PMingLiU" panose="02020500000000000000" pitchFamily="18" charset="-120"/>
@@ -18227,12 +18232,12 @@
                         </a:spcAft>
                       </a:pPr>
                       <a:r>
-                        <a:rPr lang="en-US" sz="1200">
+                        <a:rPr lang="en-US" sz="1200" dirty="0">
                           <a:effectLst/>
                         </a:rPr>
-                        <a:t>1,440,000.00</a:t>
+                        <a:t>720,000.00</a:t>
                       </a:r>
-                      <a:endParaRPr lang="en-US" sz="1100">
+                      <a:endParaRPr lang="en-US" sz="1100" dirty="0">
                         <a:effectLst/>
                         <a:latin typeface="Calibri" panose="020F0502020204030204" pitchFamily="34" charset="0"/>
                         <a:ea typeface="PMingLiU" panose="02020500000000000000" pitchFamily="18" charset="-120"/>
@@ -18259,12 +18264,12 @@
                         </a:spcAft>
                       </a:pPr>
                       <a:r>
-                        <a:rPr lang="en-US" sz="1200">
+                        <a:rPr lang="en-US" sz="1200" dirty="0">
                           <a:effectLst/>
                         </a:rPr>
-                        <a:t>1,440,000.00</a:t>
+                        <a:t>720,000.00</a:t>
                       </a:r>
-                      <a:endParaRPr lang="en-US" sz="1100">
+                      <a:endParaRPr lang="en-US" sz="1100" dirty="0">
                         <a:effectLst/>
                         <a:latin typeface="Calibri" panose="020F0502020204030204" pitchFamily="34" charset="0"/>
                         <a:ea typeface="PMingLiU" panose="02020500000000000000" pitchFamily="18" charset="-120"/>
@@ -18291,12 +18296,12 @@
                         </a:spcAft>
                       </a:pPr>
                       <a:r>
-                        <a:rPr lang="en-US" sz="1200">
+                        <a:rPr lang="en-US" sz="1200" dirty="0">
                           <a:effectLst/>
                         </a:rPr>
-                        <a:t>1,440,000.00</a:t>
+                        <a:t>720,000.00</a:t>
                       </a:r>
-                      <a:endParaRPr lang="en-US" sz="1100">
+                      <a:endParaRPr lang="en-US" sz="1100" dirty="0">
                         <a:effectLst/>
                         <a:latin typeface="Calibri" panose="020F0502020204030204" pitchFamily="34" charset="0"/>
                         <a:ea typeface="PMingLiU" panose="02020500000000000000" pitchFamily="18" charset="-120"/>
@@ -18312,7 +18317,7 @@
                   </a:ext>
                 </a:extLst>
               </a:tr>
-              <a:tr h="673197">
+              <a:tr h="396817">
                 <a:tc>
                   <a:txBody>
                     <a:bodyPr/>
@@ -18330,12 +18335,12 @@
                         </a:spcAft>
                       </a:pPr>
                       <a:r>
-                        <a:rPr lang="en-US" sz="1200">
+                        <a:rPr lang="en-US" sz="1200" dirty="0">
                           <a:effectLst/>
                         </a:rPr>
                         <a:t>Eliminate Additional Position</a:t>
                       </a:r>
-                      <a:endParaRPr lang="en-US" sz="1100">
+                      <a:endParaRPr lang="en-US" sz="1100" dirty="0">
                         <a:effectLst/>
                         <a:latin typeface="Calibri" panose="020F0502020204030204" pitchFamily="34" charset="0"/>
                         <a:ea typeface="PMingLiU" panose="02020500000000000000" pitchFamily="18" charset="-120"/>
@@ -18760,12 +18765,12 @@
                         </a:spcAft>
                       </a:pPr>
                       <a:r>
-                        <a:rPr lang="en-US" sz="1200">
+                        <a:rPr lang="en-US" sz="1200" dirty="0">
                           <a:effectLst/>
                         </a:rPr>
-                        <a:t>5,040,000.00</a:t>
+                        <a:t>4,320,000.00</a:t>
                       </a:r>
-                      <a:endParaRPr lang="en-US" sz="1100">
+                      <a:endParaRPr lang="en-US" sz="1100" dirty="0">
                         <a:effectLst/>
                         <a:latin typeface="Calibri" panose="020F0502020204030204" pitchFamily="34" charset="0"/>
                         <a:ea typeface="PMingLiU" panose="02020500000000000000" pitchFamily="18" charset="-120"/>
@@ -18792,12 +18797,12 @@
                         </a:spcAft>
                       </a:pPr>
                       <a:r>
-                        <a:rPr lang="en-US" sz="1200">
+                        <a:rPr lang="en-US" sz="1200" dirty="0">
                           <a:effectLst/>
                         </a:rPr>
-                        <a:t>5,040,000.00</a:t>
+                        <a:t>4,320,000.00</a:t>
                       </a:r>
-                      <a:endParaRPr lang="en-US" sz="1100">
+                      <a:endParaRPr lang="en-US" sz="1100" dirty="0">
                         <a:effectLst/>
                         <a:latin typeface="Calibri" panose="020F0502020204030204" pitchFamily="34" charset="0"/>
                         <a:ea typeface="PMingLiU" panose="02020500000000000000" pitchFamily="18" charset="-120"/>
@@ -18824,12 +18829,12 @@
                         </a:spcAft>
                       </a:pPr>
                       <a:r>
-                        <a:rPr lang="en-US" sz="1200">
+                        <a:rPr lang="en-US" sz="1200" dirty="0">
                           <a:effectLst/>
                         </a:rPr>
-                        <a:t>5,040,000.00</a:t>
+                        <a:t>4,320,000.00</a:t>
                       </a:r>
-                      <a:endParaRPr lang="en-US" sz="1100">
+                      <a:endParaRPr lang="en-US" sz="1100" dirty="0">
                         <a:effectLst/>
                         <a:latin typeface="Calibri" panose="020F0502020204030204" pitchFamily="34" charset="0"/>
                         <a:ea typeface="PMingLiU" panose="02020500000000000000" pitchFamily="18" charset="-120"/>
@@ -18856,12 +18861,12 @@
                         </a:spcAft>
                       </a:pPr>
                       <a:r>
-                        <a:rPr lang="en-US" sz="1200">
+                        <a:rPr lang="en-US" sz="1200" dirty="0">
                           <a:effectLst/>
                         </a:rPr>
-                        <a:t>5,040,000.00</a:t>
+                        <a:t>4,320,000.00</a:t>
                       </a:r>
-                      <a:endParaRPr lang="en-US" sz="1100">
+                      <a:endParaRPr lang="en-US" sz="1100" dirty="0">
                         <a:effectLst/>
                         <a:latin typeface="Calibri" panose="020F0502020204030204" pitchFamily="34" charset="0"/>
                         <a:ea typeface="PMingLiU" panose="02020500000000000000" pitchFamily="18" charset="-120"/>
@@ -18891,7 +18896,7 @@
                         <a:rPr lang="en-US" sz="1200" dirty="0">
                           <a:effectLst/>
                         </a:rPr>
-                        <a:t>5,040,000.00</a:t>
+                        <a:t>4,320,000.00</a:t>
                       </a:r>
                       <a:endParaRPr lang="en-US" sz="1100" dirty="0">
                         <a:effectLst/>

</xml_diff>